<commit_message>
added lecture for today
</commit_message>
<xml_diff>
--- a/files/2014-lecture2-sequencing.pptx
+++ b/files/2014-lecture2-sequencing.pptx
@@ -3312,6 +3312,13 @@
   <p:clrMapOvr>
     <a:masterClrMapping/>
   </p:clrMapOvr>
+  <p:timing>
+    <p:tnLst>
+      <p:par>
+        <p:cTn xmlns:p14="http://schemas.microsoft.com/office/powerpoint/2010/main" id="1" dur="indefinite" restart="never" nodeType="tmRoot"/>
+      </p:par>
+    </p:tnLst>
+  </p:timing>
 </p:sld>
 </file>
 
@@ -4038,6 +4045,13 @@
   <p:clrMapOvr>
     <a:masterClrMapping/>
   </p:clrMapOvr>
+  <p:timing>
+    <p:tnLst>
+      <p:par>
+        <p:cTn xmlns:p14="http://schemas.microsoft.com/office/powerpoint/2010/main" id="1" dur="indefinite" restart="never" nodeType="tmRoot"/>
+      </p:par>
+    </p:tnLst>
+  </p:timing>
 </p:sld>
 </file>
 
@@ -4204,6 +4218,13 @@
   <p:clrMapOvr>
     <a:masterClrMapping/>
   </p:clrMapOvr>
+  <p:timing>
+    <p:tnLst>
+      <p:par>
+        <p:cTn xmlns:p14="http://schemas.microsoft.com/office/powerpoint/2010/main" id="1" dur="indefinite" restart="never" nodeType="tmRoot"/>
+      </p:par>
+    </p:tnLst>
+  </p:timing>
 </p:sld>
 </file>
 
@@ -4320,6 +4341,13 @@
   <p:clrMapOvr>
     <a:masterClrMapping/>
   </p:clrMapOvr>
+  <p:timing>
+    <p:tnLst>
+      <p:par>
+        <p:cTn xmlns:p14="http://schemas.microsoft.com/office/powerpoint/2010/main" id="1" dur="indefinite" restart="never" nodeType="tmRoot"/>
+      </p:par>
+    </p:tnLst>
+  </p:timing>
 </p:sld>
 </file>
 
@@ -4494,6 +4522,13 @@
   <p:clrMapOvr>
     <a:masterClrMapping/>
   </p:clrMapOvr>
+  <p:timing>
+    <p:tnLst>
+      <p:par>
+        <p:cTn xmlns:p14="http://schemas.microsoft.com/office/powerpoint/2010/main" id="1" dur="indefinite" restart="never" nodeType="tmRoot"/>
+      </p:par>
+    </p:tnLst>
+  </p:timing>
 </p:sld>
 </file>
 
@@ -4735,6 +4770,13 @@
   <p:clrMapOvr>
     <a:masterClrMapping/>
   </p:clrMapOvr>
+  <p:timing>
+    <p:tnLst>
+      <p:par>
+        <p:cTn xmlns:p14="http://schemas.microsoft.com/office/powerpoint/2010/main" id="1" dur="indefinite" restart="never" nodeType="tmRoot"/>
+      </p:par>
+    </p:tnLst>
+  </p:timing>
 </p:sld>
 </file>
 
@@ -4960,6 +5002,13 @@
   <p:clrMapOvr>
     <a:masterClrMapping/>
   </p:clrMapOvr>
+  <p:timing>
+    <p:tnLst>
+      <p:par>
+        <p:cTn xmlns:p14="http://schemas.microsoft.com/office/powerpoint/2010/main" id="1" dur="indefinite" restart="never" nodeType="tmRoot"/>
+      </p:par>
+    </p:tnLst>
+  </p:timing>
 </p:sld>
 </file>
 
@@ -5032,6 +5081,13 @@
   <p:clrMapOvr>
     <a:masterClrMapping/>
   </p:clrMapOvr>
+  <p:timing>
+    <p:tnLst>
+      <p:par>
+        <p:cTn xmlns:p14="http://schemas.microsoft.com/office/powerpoint/2010/main" id="1" dur="indefinite" restart="never" nodeType="tmRoot"/>
+      </p:par>
+    </p:tnLst>
+  </p:timing>
 </p:sld>
 </file>
 
@@ -5111,6 +5167,13 @@
   <p:clrMapOvr>
     <a:masterClrMapping/>
   </p:clrMapOvr>
+  <p:timing>
+    <p:tnLst>
+      <p:par>
+        <p:cTn xmlns:p14="http://schemas.microsoft.com/office/powerpoint/2010/main" id="1" dur="indefinite" restart="never" nodeType="tmRoot"/>
+      </p:par>
+    </p:tnLst>
+  </p:timing>
 </p:sld>
 </file>
 
@@ -5285,6 +5348,13 @@
   <p:clrMapOvr>
     <a:masterClrMapping/>
   </p:clrMapOvr>
+  <p:timing>
+    <p:tnLst>
+      <p:par>
+        <p:cTn xmlns:p14="http://schemas.microsoft.com/office/powerpoint/2010/main" id="1" dur="indefinite" restart="never" nodeType="tmRoot"/>
+      </p:par>
+    </p:tnLst>
+  </p:timing>
 </p:sld>
 </file>
 
@@ -5472,6 +5542,13 @@
   <p:clrMapOvr>
     <a:masterClrMapping/>
   </p:clrMapOvr>
+  <p:timing>
+    <p:tnLst>
+      <p:par>
+        <p:cTn xmlns:p14="http://schemas.microsoft.com/office/powerpoint/2010/main" id="1" dur="indefinite" restart="never" nodeType="tmRoot"/>
+      </p:par>
+    </p:tnLst>
+  </p:timing>
 </p:sld>
 </file>
 
@@ -5567,6 +5644,13 @@
   <p:clrMapOvr>
     <a:masterClrMapping/>
   </p:clrMapOvr>
+  <p:timing>
+    <p:tnLst>
+      <p:par>
+        <p:cTn xmlns:p14="http://schemas.microsoft.com/office/powerpoint/2010/main" id="1" dur="indefinite" restart="never" nodeType="tmRoot"/>
+      </p:par>
+    </p:tnLst>
+  </p:timing>
 </p:sld>
 </file>
 
@@ -5680,6 +5764,13 @@
   <p:clrMapOvr>
     <a:masterClrMapping/>
   </p:clrMapOvr>
+  <p:timing>
+    <p:tnLst>
+      <p:par>
+        <p:cTn xmlns:p14="http://schemas.microsoft.com/office/powerpoint/2010/main" id="1" dur="indefinite" restart="never" nodeType="tmRoot"/>
+      </p:par>
+    </p:tnLst>
+  </p:timing>
 </p:sld>
 </file>
 
@@ -5783,6 +5874,13 @@
   <p:clrMapOvr>
     <a:masterClrMapping/>
   </p:clrMapOvr>
+  <p:timing>
+    <p:tnLst>
+      <p:par>
+        <p:cTn xmlns:p14="http://schemas.microsoft.com/office/powerpoint/2010/main" id="1" dur="indefinite" restart="never" nodeType="tmRoot"/>
+      </p:par>
+    </p:tnLst>
+  </p:timing>
 </p:sld>
 </file>
 
@@ -5890,6 +5988,13 @@
   <p:clrMapOvr>
     <a:masterClrMapping/>
   </p:clrMapOvr>
+  <p:timing>
+    <p:tnLst>
+      <p:par>
+        <p:cTn xmlns:p14="http://schemas.microsoft.com/office/powerpoint/2010/main" id="1" dur="indefinite" restart="never" nodeType="tmRoot"/>
+      </p:par>
+    </p:tnLst>
+  </p:timing>
 </p:sld>
 </file>
 
@@ -6071,6 +6176,13 @@
   <p:clrMapOvr>
     <a:masterClrMapping/>
   </p:clrMapOvr>
+  <p:timing>
+    <p:tnLst>
+      <p:par>
+        <p:cTn xmlns:p14="http://schemas.microsoft.com/office/powerpoint/2010/main" id="1" dur="indefinite" restart="never" nodeType="tmRoot"/>
+      </p:par>
+    </p:tnLst>
+  </p:timing>
 </p:sld>
 </file>
 
@@ -6306,6 +6418,13 @@
   <p:clrMapOvr>
     <a:masterClrMapping/>
   </p:clrMapOvr>
+  <p:timing>
+    <p:tnLst>
+      <p:par>
+        <p:cTn xmlns:p14="http://schemas.microsoft.com/office/powerpoint/2010/main" id="1" dur="indefinite" restart="never" nodeType="tmRoot"/>
+      </p:par>
+    </p:tnLst>
+  </p:timing>
 </p:sld>
 </file>
 
@@ -7021,6 +7140,13 @@
   <p:clrMapOvr>
     <a:masterClrMapping/>
   </p:clrMapOvr>
+  <p:timing>
+    <p:tnLst>
+      <p:par>
+        <p:cTn xmlns:p14="http://schemas.microsoft.com/office/powerpoint/2010/main" id="1" dur="indefinite" restart="never" nodeType="tmRoot"/>
+      </p:par>
+    </p:tnLst>
+  </p:timing>
 </p:sld>
 </file>
 
@@ -7222,6 +7348,13 @@
   <p:clrMapOvr>
     <a:masterClrMapping/>
   </p:clrMapOvr>
+  <p:timing>
+    <p:tnLst>
+      <p:par>
+        <p:cTn xmlns:p14="http://schemas.microsoft.com/office/powerpoint/2010/main" id="1" dur="indefinite" restart="never" nodeType="tmRoot"/>
+      </p:par>
+    </p:tnLst>
+  </p:timing>
 </p:sld>
 </file>
 
@@ -7376,6 +7509,13 @@
   <p:clrMapOvr>
     <a:masterClrMapping/>
   </p:clrMapOvr>
+  <p:timing>
+    <p:tnLst>
+      <p:par>
+        <p:cTn xmlns:p14="http://schemas.microsoft.com/office/powerpoint/2010/main" id="1" dur="indefinite" restart="never" nodeType="tmRoot"/>
+      </p:par>
+    </p:tnLst>
+  </p:timing>
 </p:sld>
 </file>
 
@@ -7413,13 +7553,9 @@
           <a:p>
             <a:r>
               <a:rPr lang="en-US" dirty="0" smtClean="0"/>
-              <a:t>Sequencing </a:t>
-            </a:r>
-            <a:r>
-              <a:rPr lang="en-US" smtClean="0"/>
-              <a:t>in situ!?</a:t>
-            </a:r>
-            <a:endParaRPr lang="en-US"/>
+              <a:t>Sequencing in situ!?</a:t>
+            </a:r>
+            <a:endParaRPr lang="en-US" dirty="0"/>
           </a:p>
         </p:txBody>
       </p:sp>
@@ -7494,6 +7630,13 @@
   <p:clrMapOvr>
     <a:masterClrMapping/>
   </p:clrMapOvr>
+  <p:timing>
+    <p:tnLst>
+      <p:par>
+        <p:cTn xmlns:p14="http://schemas.microsoft.com/office/powerpoint/2010/main" id="1" dur="indefinite" restart="never" nodeType="tmRoot"/>
+      </p:par>
+    </p:tnLst>
+  </p:timing>
 </p:sld>
 </file>
 
@@ -7616,6 +7759,13 @@
   <p:clrMapOvr>
     <a:masterClrMapping/>
   </p:clrMapOvr>
+  <p:timing>
+    <p:tnLst>
+      <p:par>
+        <p:cTn xmlns:p14="http://schemas.microsoft.com/office/powerpoint/2010/main" id="1" dur="indefinite" restart="never" nodeType="tmRoot"/>
+      </p:par>
+    </p:tnLst>
+  </p:timing>
 </p:sld>
 </file>
 
@@ -7706,6 +7856,13 @@
   <p:clrMapOvr>
     <a:masterClrMapping/>
   </p:clrMapOvr>
+  <p:timing>
+    <p:tnLst>
+      <p:par>
+        <p:cTn xmlns:p14="http://schemas.microsoft.com/office/powerpoint/2010/main" id="1" dur="indefinite" restart="never" nodeType="tmRoot"/>
+      </p:par>
+    </p:tnLst>
+  </p:timing>
 </p:sld>
 </file>
 
@@ -7824,6 +7981,13 @@
   <p:clrMapOvr>
     <a:masterClrMapping/>
   </p:clrMapOvr>
+  <p:timing>
+    <p:tnLst>
+      <p:par>
+        <p:cTn xmlns:p14="http://schemas.microsoft.com/office/powerpoint/2010/main" id="1" dur="indefinite" restart="never" nodeType="tmRoot"/>
+      </p:par>
+    </p:tnLst>
+  </p:timing>
 </p:sld>
 </file>
 
@@ -7942,6 +8106,13 @@
   <p:clrMapOvr>
     <a:masterClrMapping/>
   </p:clrMapOvr>
+  <p:timing>
+    <p:tnLst>
+      <p:par>
+        <p:cTn xmlns:p14="http://schemas.microsoft.com/office/powerpoint/2010/main" id="1" dur="indefinite" restart="never" nodeType="tmRoot"/>
+      </p:par>
+    </p:tnLst>
+  </p:timing>
 </p:sld>
 </file>
 

</xml_diff>